<commit_message>
Adding in asym and tls lectures.
</commit_message>
<xml_diff>
--- a/2020fa_cs361s/lectures/20200021_Asymmetric_Cryptography.pptx
+++ b/2020fa_cs361s/lectures/20200021_Asymmetric_Cryptography.pptx
@@ -5795,7 +5795,7 @@
           <a:p>
             <a:fld id="{6CB03EA0-2F37-4F62-93D1-61BCD1BEDED7}" type="datetimeFigureOut">
               <a:rPr lang="en-US" smtClean="0"/>
-              <a:t>9/21/2020</a:t>
+              <a:t>9/28/2020</a:t>
             </a:fld>
             <a:endParaRPr lang="en-US"/>
           </a:p>
@@ -6008,7 +6008,7 @@
           <a:p>
             <a:fld id="{6CB03EA0-2F37-4F62-93D1-61BCD1BEDED7}" type="datetimeFigureOut">
               <a:rPr lang="en-US" smtClean="0"/>
-              <a:t>9/21/2020</a:t>
+              <a:t>9/28/2020</a:t>
             </a:fld>
             <a:endParaRPr lang="en-US"/>
           </a:p>
@@ -6264,7 +6264,7 @@
           <a:p>
             <a:fld id="{6CB03EA0-2F37-4F62-93D1-61BCD1BEDED7}" type="datetimeFigureOut">
               <a:rPr lang="en-US" smtClean="0"/>
-              <a:t>9/21/2020</a:t>
+              <a:t>9/28/2020</a:t>
             </a:fld>
             <a:endParaRPr lang="en-US"/>
           </a:p>
@@ -6392,7 +6392,7 @@
           <a:p>
             <a:fld id="{6CB03EA0-2F37-4F62-93D1-61BCD1BEDED7}" type="datetimeFigureOut">
               <a:rPr lang="en-US" smtClean="0"/>
-              <a:t>9/21/2020</a:t>
+              <a:t>9/28/2020</a:t>
             </a:fld>
             <a:endParaRPr lang="en-US"/>
           </a:p>
@@ -6619,7 +6619,7 @@
           <a:p>
             <a:fld id="{6CB03EA0-2F37-4F62-93D1-61BCD1BEDED7}" type="datetimeFigureOut">
               <a:rPr lang="en-US" smtClean="0"/>
-              <a:t>9/21/2020</a:t>
+              <a:t>9/28/2020</a:t>
             </a:fld>
             <a:endParaRPr lang="en-US"/>
           </a:p>
@@ -6962,7 +6962,7 @@
           <a:p>
             <a:fld id="{6CB03EA0-2F37-4F62-93D1-61BCD1BEDED7}" type="datetimeFigureOut">
               <a:rPr lang="en-US" smtClean="0"/>
-              <a:t>9/21/2020</a:t>
+              <a:t>9/28/2020</a:t>
             </a:fld>
             <a:endParaRPr lang="en-US"/>
           </a:p>
@@ -7242,7 +7242,7 @@
           <a:p>
             <a:fld id="{6CB03EA0-2F37-4F62-93D1-61BCD1BEDED7}" type="datetimeFigureOut">
               <a:rPr lang="en-US" smtClean="0"/>
-              <a:t>9/21/2020</a:t>
+              <a:t>9/28/2020</a:t>
             </a:fld>
             <a:endParaRPr lang="en-US"/>
           </a:p>
@@ -7621,7 +7621,7 @@
           <a:p>
             <a:fld id="{6CB03EA0-2F37-4F62-93D1-61BCD1BEDED7}" type="datetimeFigureOut">
               <a:rPr lang="en-US" smtClean="0"/>
-              <a:t>9/21/2020</a:t>
+              <a:t>9/28/2020</a:t>
             </a:fld>
             <a:endParaRPr lang="en-US"/>
           </a:p>
@@ -7739,7 +7739,7 @@
           <a:p>
             <a:fld id="{6CB03EA0-2F37-4F62-93D1-61BCD1BEDED7}" type="datetimeFigureOut">
               <a:rPr lang="en-US" smtClean="0"/>
-              <a:t>9/21/2020</a:t>
+              <a:t>9/28/2020</a:t>
             </a:fld>
             <a:endParaRPr lang="en-US"/>
           </a:p>
@@ -7910,7 +7910,7 @@
           <a:p>
             <a:fld id="{6CB03EA0-2F37-4F62-93D1-61BCD1BEDED7}" type="datetimeFigureOut">
               <a:rPr lang="en-US" smtClean="0"/>
-              <a:t>9/21/2020</a:t>
+              <a:t>9/28/2020</a:t>
             </a:fld>
             <a:endParaRPr lang="en-US"/>
           </a:p>
@@ -8264,7 +8264,7 @@
           <a:p>
             <a:fld id="{6CB03EA0-2F37-4F62-93D1-61BCD1BEDED7}" type="datetimeFigureOut">
               <a:rPr lang="en-US" smtClean="0"/>
-              <a:t>9/21/2020</a:t>
+              <a:t>9/28/2020</a:t>
             </a:fld>
             <a:endParaRPr lang="en-US"/>
           </a:p>
@@ -8646,7 +8646,7 @@
           <a:p>
             <a:fld id="{6CB03EA0-2F37-4F62-93D1-61BCD1BEDED7}" type="datetimeFigureOut">
               <a:rPr lang="en-US" smtClean="0"/>
-              <a:t>9/21/2020</a:t>
+              <a:t>9/28/2020</a:t>
             </a:fld>
             <a:endParaRPr lang="en-US"/>
           </a:p>
@@ -8933,7 +8933,7 @@
           <a:p>
             <a:fld id="{6CB03EA0-2F37-4F62-93D1-61BCD1BEDED7}" type="datetimeFigureOut">
               <a:rPr lang="en-US" smtClean="0"/>
-              <a:t>9/21/2020</a:t>
+              <a:t>9/28/2020</a:t>
             </a:fld>
             <a:endParaRPr lang="en-US"/>
           </a:p>
@@ -10489,12 +10489,17 @@
             <a:pPr lvl="1"/>
             <a:r>
               <a:rPr lang="en-US" dirty="0"/>
-              <a:t>A → B : {M}g</a:t>
-            </a:r>
-            <a:r>
-              <a:rPr lang="en-US" baseline="30000" dirty="0"/>
-              <a:t>RARB</a:t>
-            </a:r>
+              <a:t>A → B : {M}</a:t>
+            </a:r>
+            <a:r>
+              <a:rPr lang="en-US" dirty="0" err="1"/>
+              <a:t>g</a:t>
+            </a:r>
+            <a:r>
+              <a:rPr lang="en-US" baseline="30000" dirty="0" err="1"/>
+              <a:t>RAB</a:t>
+            </a:r>
+            <a:endParaRPr lang="en-US" baseline="30000" dirty="0"/>
           </a:p>
           <a:p>
             <a:r>
@@ -10533,7 +10538,7 @@
             </a:r>
             <a:r>
               <a:rPr lang="en-US" baseline="30000" dirty="0" err="1"/>
-              <a:t>RARB</a:t>
+              <a:t>RAB</a:t>
             </a:r>
             <a:endParaRPr lang="en-US" baseline="30000" dirty="0"/>
           </a:p>
@@ -12066,8 +12071,8 @@
         </p:blipFill>
         <p:spPr bwMode="auto">
           <a:xfrm>
-            <a:off x="2844629" y="2323352"/>
-            <a:ext cx="3454743" cy="3630503"/>
+            <a:off x="2308860" y="1774816"/>
+            <a:ext cx="4572000" cy="4804601"/>
           </a:xfrm>
           <a:prstGeom prst="rect">
             <a:avLst/>

</xml_diff>